<commit_message>
DS: References sorted and image slightly changed for PSSA process.
</commit_message>
<xml_diff>
--- a/doc/RESS_Journal/images/safety_process.pptx
+++ b/doc/RESS_Journal/images/safety_process.pptx
@@ -243,7 +243,7 @@
           <a:p>
             <a:fld id="{AD5E61AC-1B65-4B99-B183-C9D05AB65BC0}" type="datetimeFigureOut">
               <a:rPr lang="en-US" smtClean="0"/>
-              <a:t>12/11/2018</a:t>
+              <a:t>6/13/2019</a:t>
             </a:fld>
             <a:endParaRPr lang="en-US"/>
           </a:p>
@@ -413,7 +413,7 @@
           <a:p>
             <a:fld id="{AD5E61AC-1B65-4B99-B183-C9D05AB65BC0}" type="datetimeFigureOut">
               <a:rPr lang="en-US" smtClean="0"/>
-              <a:t>12/11/2018</a:t>
+              <a:t>6/13/2019</a:t>
             </a:fld>
             <a:endParaRPr lang="en-US"/>
           </a:p>
@@ -593,7 +593,7 @@
           <a:p>
             <a:fld id="{AD5E61AC-1B65-4B99-B183-C9D05AB65BC0}" type="datetimeFigureOut">
               <a:rPr lang="en-US" smtClean="0"/>
-              <a:t>12/11/2018</a:t>
+              <a:t>6/13/2019</a:t>
             </a:fld>
             <a:endParaRPr lang="en-US"/>
           </a:p>
@@ -763,7 +763,7 @@
           <a:p>
             <a:fld id="{AD5E61AC-1B65-4B99-B183-C9D05AB65BC0}" type="datetimeFigureOut">
               <a:rPr lang="en-US" smtClean="0"/>
-              <a:t>12/11/2018</a:t>
+              <a:t>6/13/2019</a:t>
             </a:fld>
             <a:endParaRPr lang="en-US"/>
           </a:p>
@@ -1009,7 +1009,7 @@
           <a:p>
             <a:fld id="{AD5E61AC-1B65-4B99-B183-C9D05AB65BC0}" type="datetimeFigureOut">
               <a:rPr lang="en-US" smtClean="0"/>
-              <a:t>12/11/2018</a:t>
+              <a:t>6/13/2019</a:t>
             </a:fld>
             <a:endParaRPr lang="en-US"/>
           </a:p>
@@ -1241,7 +1241,7 @@
           <a:p>
             <a:fld id="{AD5E61AC-1B65-4B99-B183-C9D05AB65BC0}" type="datetimeFigureOut">
               <a:rPr lang="en-US" smtClean="0"/>
-              <a:t>12/11/2018</a:t>
+              <a:t>6/13/2019</a:t>
             </a:fld>
             <a:endParaRPr lang="en-US"/>
           </a:p>
@@ -1608,7 +1608,7 @@
           <a:p>
             <a:fld id="{AD5E61AC-1B65-4B99-B183-C9D05AB65BC0}" type="datetimeFigureOut">
               <a:rPr lang="en-US" smtClean="0"/>
-              <a:t>12/11/2018</a:t>
+              <a:t>6/13/2019</a:t>
             </a:fld>
             <a:endParaRPr lang="en-US"/>
           </a:p>
@@ -1726,7 +1726,7 @@
           <a:p>
             <a:fld id="{AD5E61AC-1B65-4B99-B183-C9D05AB65BC0}" type="datetimeFigureOut">
               <a:rPr lang="en-US" smtClean="0"/>
-              <a:t>12/11/2018</a:t>
+              <a:t>6/13/2019</a:t>
             </a:fld>
             <a:endParaRPr lang="en-US"/>
           </a:p>
@@ -1821,7 +1821,7 @@
           <a:p>
             <a:fld id="{AD5E61AC-1B65-4B99-B183-C9D05AB65BC0}" type="datetimeFigureOut">
               <a:rPr lang="en-US" smtClean="0"/>
-              <a:t>12/11/2018</a:t>
+              <a:t>6/13/2019</a:t>
             </a:fld>
             <a:endParaRPr lang="en-US"/>
           </a:p>
@@ -2098,7 +2098,7 @@
           <a:p>
             <a:fld id="{AD5E61AC-1B65-4B99-B183-C9D05AB65BC0}" type="datetimeFigureOut">
               <a:rPr lang="en-US" smtClean="0"/>
-              <a:t>12/11/2018</a:t>
+              <a:t>6/13/2019</a:t>
             </a:fld>
             <a:endParaRPr lang="en-US"/>
           </a:p>
@@ -2351,7 +2351,7 @@
           <a:p>
             <a:fld id="{AD5E61AC-1B65-4B99-B183-C9D05AB65BC0}" type="datetimeFigureOut">
               <a:rPr lang="en-US" smtClean="0"/>
-              <a:t>12/11/2018</a:t>
+              <a:t>6/13/2019</a:t>
             </a:fld>
             <a:endParaRPr lang="en-US"/>
           </a:p>
@@ -2564,7 +2564,7 @@
           <a:p>
             <a:fld id="{AD5E61AC-1B65-4B99-B183-C9D05AB65BC0}" type="datetimeFigureOut">
               <a:rPr lang="en-US" smtClean="0"/>
-              <a:t>12/11/2018</a:t>
+              <a:t>6/13/2019</a:t>
             </a:fld>
             <a:endParaRPr lang="en-US"/>
           </a:p>
@@ -3422,16 +3422,16 @@
       </p:sp>
       <p:sp>
         <p:nvSpPr>
-          <p:cNvPr id="24" name="Left Arrow 23"/>
+          <p:cNvPr id="38" name="Rectangle 37"/>
           <p:cNvSpPr/>
           <p:nvPr/>
         </p:nvSpPr>
         <p:spPr>
           <a:xfrm>
-            <a:off x="2328671" y="3588142"/>
-            <a:ext cx="1270921" cy="507538"/>
-          </a:xfrm>
-          <a:prstGeom prst="leftArrow">
+            <a:off x="5812156" y="2196634"/>
+            <a:ext cx="1742217" cy="908699"/>
+          </a:xfrm>
+          <a:prstGeom prst="rect">
             <a:avLst/>
           </a:prstGeom>
           <a:noFill/>
@@ -3458,26 +3458,34 @@
           </a:fontRef>
         </p:style>
         <p:txBody>
-          <a:bodyPr rtlCol="0" anchor="ctr"/>
+          <a:bodyPr rtlCol="0" anchor="t"/>
           <a:lstStyle/>
           <a:p>
             <a:pPr algn="ctr"/>
-            <a:endParaRPr lang="en-US"/>
-          </a:p>
-        </p:txBody>
-      </p:sp>
-      <p:sp>
-        <p:nvSpPr>
-          <p:cNvPr id="26" name="Down Arrow 25"/>
+            <a:r>
+              <a:rPr lang="en-US" sz="2400" dirty="0" smtClean="0">
+                <a:solidFill>
+                  <a:schemeClr val="tx1"/>
+                </a:solidFill>
+              </a:rPr>
+              <a:t>System Architecture</a:t>
+            </a:r>
+            <a:endParaRPr lang="en-US" sz="2400" dirty="0"/>
+          </a:p>
+        </p:txBody>
+      </p:sp>
+      <p:sp>
+        <p:nvSpPr>
+          <p:cNvPr id="39" name="Rectangle 38"/>
           <p:cNvSpPr/>
           <p:nvPr/>
         </p:nvSpPr>
         <p:spPr>
           <a:xfrm>
-            <a:off x="10411968" y="2356987"/>
-            <a:ext cx="426720" cy="556712"/>
-          </a:xfrm>
-          <a:prstGeom prst="downArrow">
+            <a:off x="5812156" y="3483563"/>
+            <a:ext cx="1770002" cy="908699"/>
+          </a:xfrm>
+          <a:prstGeom prst="rect">
             <a:avLst/>
           </a:prstGeom>
           <a:noFill/>
@@ -3504,26 +3512,34 @@
           </a:fontRef>
         </p:style>
         <p:txBody>
-          <a:bodyPr rtlCol="0" anchor="ctr"/>
+          <a:bodyPr rtlCol="0" anchor="t"/>
           <a:lstStyle/>
           <a:p>
             <a:pPr algn="ctr"/>
-            <a:endParaRPr lang="en-US"/>
-          </a:p>
-        </p:txBody>
-      </p:sp>
-      <p:sp>
-        <p:nvSpPr>
-          <p:cNvPr id="27" name="Down Arrow 26"/>
+            <a:r>
+              <a:rPr lang="en-US" sz="2400" dirty="0" smtClean="0">
+                <a:solidFill>
+                  <a:schemeClr val="tx1"/>
+                </a:solidFill>
+              </a:rPr>
+              <a:t>Functional Behavior</a:t>
+            </a:r>
+            <a:endParaRPr lang="en-US" sz="2400" dirty="0"/>
+          </a:p>
+        </p:txBody>
+      </p:sp>
+      <p:sp>
+        <p:nvSpPr>
+          <p:cNvPr id="40" name="Rectangle 39"/>
           <p:cNvSpPr/>
           <p:nvPr/>
         </p:nvSpPr>
         <p:spPr>
           <a:xfrm>
-            <a:off x="10411968" y="4413330"/>
-            <a:ext cx="426720" cy="563726"/>
-          </a:xfrm>
-          <a:prstGeom prst="downArrow">
+            <a:off x="3868976" y="2204776"/>
+            <a:ext cx="1221117" cy="806372"/>
+          </a:xfrm>
+          <a:prstGeom prst="rect">
             <a:avLst/>
           </a:prstGeom>
           <a:noFill/>
@@ -3550,26 +3566,34 @@
           </a:fontRef>
         </p:style>
         <p:txBody>
-          <a:bodyPr rtlCol="0" anchor="ctr"/>
+          <a:bodyPr rtlCol="0" anchor="t"/>
           <a:lstStyle/>
           <a:p>
             <a:pPr algn="ctr"/>
-            <a:endParaRPr lang="en-US"/>
-          </a:p>
-        </p:txBody>
-      </p:sp>
-      <p:sp>
-        <p:nvSpPr>
-          <p:cNvPr id="28" name="Down Arrow 27"/>
+            <a:r>
+              <a:rPr lang="en-US" sz="2400" dirty="0" smtClean="0">
+                <a:solidFill>
+                  <a:schemeClr val="tx1"/>
+                </a:solidFill>
+              </a:rPr>
+              <a:t>Failure Modes</a:t>
+            </a:r>
+            <a:endParaRPr lang="en-US" sz="2400" dirty="0"/>
+          </a:p>
+        </p:txBody>
+      </p:sp>
+      <p:sp>
+        <p:nvSpPr>
+          <p:cNvPr id="41" name="Rectangle 40"/>
           <p:cNvSpPr/>
           <p:nvPr/>
         </p:nvSpPr>
         <p:spPr>
           <a:xfrm>
-            <a:off x="1002697" y="2957716"/>
-            <a:ext cx="426720" cy="884195"/>
-          </a:xfrm>
-          <a:prstGeom prst="downArrow">
+            <a:off x="355790" y="399194"/>
+            <a:ext cx="4899783" cy="5977222"/>
+          </a:xfrm>
+          <a:prstGeom prst="rect">
             <a:avLst/>
           </a:prstGeom>
           <a:noFill/>
@@ -3596,26 +3620,34 @@
           </a:fontRef>
         </p:style>
         <p:txBody>
-          <a:bodyPr rtlCol="0" anchor="ctr"/>
+          <a:bodyPr rtlCol="0" anchor="t"/>
           <a:lstStyle/>
           <a:p>
             <a:pPr algn="ctr"/>
-            <a:endParaRPr lang="en-US"/>
-          </a:p>
-        </p:txBody>
-      </p:sp>
-      <p:sp>
-        <p:nvSpPr>
-          <p:cNvPr id="29" name="Right Arrow 28"/>
+            <a:r>
+              <a:rPr lang="en-US" sz="2400" dirty="0" smtClean="0">
+                <a:solidFill>
+                  <a:schemeClr val="tx1"/>
+                </a:solidFill>
+              </a:rPr>
+              <a:t>Safety Assessment Process</a:t>
+            </a:r>
+            <a:endParaRPr lang="en-US" sz="2400" dirty="0"/>
+          </a:p>
+        </p:txBody>
+      </p:sp>
+      <p:sp>
+        <p:nvSpPr>
+          <p:cNvPr id="42" name="Rectangle 41"/>
           <p:cNvSpPr/>
           <p:nvPr/>
         </p:nvSpPr>
         <p:spPr>
           <a:xfrm>
-            <a:off x="2404714" y="2971592"/>
-            <a:ext cx="1194878" cy="476277"/>
-          </a:xfrm>
-          <a:prstGeom prst="rightArrow">
+            <a:off x="5606793" y="399194"/>
+            <a:ext cx="6188969" cy="5977222"/>
+          </a:xfrm>
+          <a:prstGeom prst="rect">
             <a:avLst/>
           </a:prstGeom>
           <a:noFill/>
@@ -3642,140 +3674,32 @@
           </a:fontRef>
         </p:style>
         <p:txBody>
-          <a:bodyPr rtlCol="0" anchor="ctr"/>
+          <a:bodyPr rtlCol="0" anchor="t"/>
           <a:lstStyle/>
           <a:p>
             <a:pPr algn="ctr"/>
-            <a:endParaRPr lang="en-US"/>
-          </a:p>
-        </p:txBody>
-      </p:sp>
-      <p:sp>
-        <p:nvSpPr>
-          <p:cNvPr id="31" name="Left Bracket 30"/>
+            <a:r>
+              <a:rPr lang="en-US" sz="2400" dirty="0" smtClean="0">
+                <a:solidFill>
+                  <a:schemeClr val="tx1"/>
+                </a:solidFill>
+              </a:rPr>
+              <a:t>System Development Process</a:t>
+            </a:r>
+            <a:endParaRPr lang="en-US" sz="2400" dirty="0"/>
+          </a:p>
+        </p:txBody>
+      </p:sp>
+      <p:sp>
+        <p:nvSpPr>
+          <p:cNvPr id="43" name="Rectangle 42"/>
           <p:cNvSpPr/>
           <p:nvPr/>
         </p:nvSpPr>
         <p:spPr>
           <a:xfrm>
-            <a:off x="9229341" y="1777629"/>
-            <a:ext cx="129574" cy="3694406"/>
-          </a:xfrm>
-          <a:prstGeom prst="leftBracket">
-            <a:avLst/>
-          </a:prstGeom>
-          <a:ln>
-            <a:solidFill>
-              <a:schemeClr val="tx1"/>
-            </a:solidFill>
-          </a:ln>
-        </p:spPr>
-        <p:style>
-          <a:lnRef idx="1">
-            <a:schemeClr val="accent1"/>
-          </a:lnRef>
-          <a:fillRef idx="0">
-            <a:schemeClr val="accent1"/>
-          </a:fillRef>
-          <a:effectRef idx="0">
-            <a:schemeClr val="accent1"/>
-          </a:effectRef>
-          <a:fontRef idx="minor">
-            <a:schemeClr val="tx1"/>
-          </a:fontRef>
-        </p:style>
-        <p:txBody>
-          <a:bodyPr rtlCol="0" anchor="ctr"/>
-          <a:lstStyle/>
-          <a:p>
-            <a:pPr algn="ctr"/>
-            <a:endParaRPr lang="en-US"/>
-          </a:p>
-        </p:txBody>
-      </p:sp>
-      <p:sp>
-        <p:nvSpPr>
-          <p:cNvPr id="32" name="Right Bracket 31"/>
-          <p:cNvSpPr/>
-          <p:nvPr/>
-        </p:nvSpPr>
-        <p:spPr>
-          <a:xfrm>
-            <a:off x="1944748" y="2393211"/>
-            <a:ext cx="188852" cy="2020119"/>
-          </a:xfrm>
-          <a:prstGeom prst="rightBracket">
-            <a:avLst/>
-          </a:prstGeom>
-          <a:ln>
-            <a:solidFill>
-              <a:schemeClr val="tx1"/>
-            </a:solidFill>
-          </a:ln>
-        </p:spPr>
-        <p:style>
-          <a:lnRef idx="1">
-            <a:schemeClr val="accent1"/>
-          </a:lnRef>
-          <a:fillRef idx="0">
-            <a:schemeClr val="accent1"/>
-          </a:fillRef>
-          <a:effectRef idx="0">
-            <a:schemeClr val="accent1"/>
-          </a:effectRef>
-          <a:fontRef idx="minor">
-            <a:schemeClr val="tx1"/>
-          </a:fontRef>
-        </p:style>
-        <p:txBody>
-          <a:bodyPr rtlCol="0" anchor="ctr"/>
-          <a:lstStyle/>
-          <a:p>
-            <a:pPr algn="ctr"/>
-            <a:endParaRPr lang="en-US"/>
-          </a:p>
-        </p:txBody>
-      </p:sp>
-      <p:sp>
-        <p:nvSpPr>
-          <p:cNvPr id="37" name="TextBox 36"/>
-          <p:cNvSpPr txBox="1"/>
-          <p:nvPr/>
-        </p:nvSpPr>
-        <p:spPr>
-          <a:xfrm>
-            <a:off x="8109231" y="2780315"/>
-            <a:ext cx="935643" cy="461665"/>
-          </a:xfrm>
-          <a:prstGeom prst="rect">
-            <a:avLst/>
-          </a:prstGeom>
-          <a:noFill/>
-        </p:spPr>
-        <p:txBody>
-          <a:bodyPr wrap="square" rtlCol="0">
-            <a:spAutoFit/>
-          </a:bodyPr>
-          <a:lstStyle/>
-          <a:p>
-            <a:r>
-              <a:rPr lang="en-US" sz="2400" dirty="0" smtClean="0"/>
-              <a:t>sync</a:t>
-            </a:r>
-            <a:endParaRPr lang="en-US" sz="2400" dirty="0"/>
-          </a:p>
-        </p:txBody>
-      </p:sp>
-      <p:sp>
-        <p:nvSpPr>
-          <p:cNvPr id="38" name="Rectangle 37"/>
-          <p:cNvSpPr/>
-          <p:nvPr/>
-        </p:nvSpPr>
-        <p:spPr>
-          <a:xfrm>
-            <a:off x="5812156" y="2196634"/>
-            <a:ext cx="1742217" cy="908699"/>
+            <a:off x="3875005" y="3511878"/>
+            <a:ext cx="1221117" cy="806372"/>
           </a:xfrm>
           <a:prstGeom prst="rect">
             <a:avLst/>
@@ -3814,7 +3738,7 @@
                   <a:schemeClr val="tx1"/>
                 </a:solidFill>
               </a:rPr>
-              <a:t>System Architecture</a:t>
+              <a:t>Failure Rates</a:t>
             </a:r>
             <a:endParaRPr lang="en-US" sz="2400" dirty="0"/>
           </a:p>
@@ -3822,161 +3746,89 @@
       </p:sp>
       <p:sp>
         <p:nvSpPr>
-          <p:cNvPr id="39" name="Rectangle 38"/>
-          <p:cNvSpPr/>
+          <p:cNvPr id="44" name="TextBox 43"/>
+          <p:cNvSpPr txBox="1"/>
           <p:nvPr/>
         </p:nvSpPr>
         <p:spPr>
           <a:xfrm>
-            <a:off x="5812156" y="3483563"/>
-            <a:ext cx="1770002" cy="908699"/>
+            <a:off x="880777" y="4596383"/>
+            <a:ext cx="975360" cy="1107996"/>
           </a:xfrm>
           <a:prstGeom prst="rect">
             <a:avLst/>
           </a:prstGeom>
           <a:noFill/>
-          <a:ln>
-            <a:solidFill>
-              <a:schemeClr val="tx1"/>
-            </a:solidFill>
-          </a:ln>
-        </p:spPr>
-        <p:style>
-          <a:lnRef idx="2">
-            <a:schemeClr val="accent1">
-              <a:shade val="50000"/>
-            </a:schemeClr>
-          </a:lnRef>
-          <a:fillRef idx="1">
-            <a:schemeClr val="accent1"/>
-          </a:fillRef>
-          <a:effectRef idx="0">
-            <a:schemeClr val="accent1"/>
-          </a:effectRef>
-          <a:fontRef idx="minor">
-            <a:schemeClr val="lt1"/>
-          </a:fontRef>
-        </p:style>
-        <p:txBody>
-          <a:bodyPr rtlCol="0" anchor="t"/>
-          <a:lstStyle/>
-          <a:p>
-            <a:pPr algn="ctr"/>
-            <a:r>
-              <a:rPr lang="en-US" sz="2400" dirty="0" smtClean="0">
-                <a:solidFill>
-                  <a:schemeClr val="tx1"/>
-                </a:solidFill>
-              </a:rPr>
-              <a:t>Functional Behavior</a:t>
-            </a:r>
-            <a:endParaRPr lang="en-US" sz="2400" dirty="0"/>
-          </a:p>
-        </p:txBody>
-      </p:sp>
-      <p:sp>
-        <p:nvSpPr>
-          <p:cNvPr id="40" name="Rectangle 39"/>
-          <p:cNvSpPr/>
+        </p:spPr>
+        <p:txBody>
+          <a:bodyPr wrap="square" rtlCol="0">
+            <a:spAutoFit/>
+          </a:bodyPr>
+          <a:lstStyle/>
+          <a:p>
+            <a:r>
+              <a:rPr lang="en-US" sz="6600" dirty="0" smtClean="0"/>
+              <a:t>…</a:t>
+            </a:r>
+            <a:endParaRPr lang="en-US" sz="6600" dirty="0"/>
+          </a:p>
+        </p:txBody>
+      </p:sp>
+      <p:sp>
+        <p:nvSpPr>
+          <p:cNvPr id="45" name="TextBox 44"/>
+          <p:cNvSpPr txBox="1"/>
           <p:nvPr/>
         </p:nvSpPr>
         <p:spPr>
           <a:xfrm>
-            <a:off x="3868976" y="2204776"/>
-            <a:ext cx="1221117" cy="806372"/>
+            <a:off x="6328393" y="4060124"/>
+            <a:ext cx="975360" cy="1107996"/>
           </a:xfrm>
           <a:prstGeom prst="rect">
             <a:avLst/>
           </a:prstGeom>
           <a:noFill/>
-          <a:ln>
-            <a:solidFill>
-              <a:schemeClr val="tx1"/>
-            </a:solidFill>
-          </a:ln>
-        </p:spPr>
-        <p:style>
-          <a:lnRef idx="2">
-            <a:schemeClr val="accent1">
-              <a:shade val="50000"/>
-            </a:schemeClr>
-          </a:lnRef>
-          <a:fillRef idx="1">
-            <a:schemeClr val="accent1"/>
-          </a:fillRef>
-          <a:effectRef idx="0">
-            <a:schemeClr val="accent1"/>
-          </a:effectRef>
-          <a:fontRef idx="minor">
-            <a:schemeClr val="lt1"/>
-          </a:fontRef>
-        </p:style>
-        <p:txBody>
-          <a:bodyPr rtlCol="0" anchor="t"/>
-          <a:lstStyle/>
-          <a:p>
-            <a:pPr algn="ctr"/>
-            <a:r>
-              <a:rPr lang="en-US" sz="2400" dirty="0" smtClean="0">
-                <a:solidFill>
-                  <a:schemeClr val="tx1"/>
-                </a:solidFill>
-              </a:rPr>
-              <a:t>Failure Modes</a:t>
-            </a:r>
-            <a:endParaRPr lang="en-US" sz="2400" dirty="0"/>
-          </a:p>
-        </p:txBody>
-      </p:sp>
-      <p:sp>
-        <p:nvSpPr>
-          <p:cNvPr id="41" name="Rectangle 40"/>
-          <p:cNvSpPr/>
+        </p:spPr>
+        <p:txBody>
+          <a:bodyPr wrap="square" rtlCol="0">
+            <a:spAutoFit/>
+          </a:bodyPr>
+          <a:lstStyle/>
+          <a:p>
+            <a:r>
+              <a:rPr lang="en-US" sz="6600" dirty="0" smtClean="0"/>
+              <a:t>…</a:t>
+            </a:r>
+            <a:endParaRPr lang="en-US" sz="6600" dirty="0"/>
+          </a:p>
+        </p:txBody>
+      </p:sp>
+      <p:sp>
+        <p:nvSpPr>
+          <p:cNvPr id="46" name="TextBox 45"/>
+          <p:cNvSpPr txBox="1"/>
           <p:nvPr/>
         </p:nvSpPr>
         <p:spPr>
           <a:xfrm>
-            <a:off x="355790" y="399194"/>
-            <a:ext cx="4899783" cy="5977222"/>
+            <a:off x="2506040" y="952146"/>
+            <a:ext cx="1380073" cy="1938992"/>
           </a:xfrm>
           <a:prstGeom prst="rect">
             <a:avLst/>
           </a:prstGeom>
           <a:noFill/>
-          <a:ln>
-            <a:solidFill>
-              <a:schemeClr val="tx1"/>
-            </a:solidFill>
-          </a:ln>
-        </p:spPr>
-        <p:style>
-          <a:lnRef idx="2">
-            <a:schemeClr val="accent1">
-              <a:shade val="50000"/>
-            </a:schemeClr>
-          </a:lnRef>
-          <a:fillRef idx="1">
-            <a:schemeClr val="accent1"/>
-          </a:fillRef>
-          <a:effectRef idx="0">
-            <a:schemeClr val="accent1"/>
-          </a:effectRef>
-          <a:fontRef idx="minor">
-            <a:schemeClr val="lt1"/>
-          </a:fontRef>
-        </p:style>
-        <p:txBody>
-          <a:bodyPr rtlCol="0" anchor="t"/>
-          <a:lstStyle/>
-          <a:p>
-            <a:pPr algn="ctr"/>
-            <a:r>
-              <a:rPr lang="en-US" sz="2400" dirty="0" smtClean="0">
-                <a:solidFill>
-                  <a:schemeClr val="tx1"/>
-                </a:solidFill>
-              </a:rPr>
-              <a:t>Safety Assessment Process</a:t>
+        </p:spPr>
+        <p:txBody>
+          <a:bodyPr wrap="square" rtlCol="0">
+            <a:spAutoFit/>
+          </a:bodyPr>
+          <a:lstStyle/>
+          <a:p>
+            <a:r>
+              <a:rPr lang="en-US" sz="2400" dirty="0" smtClean="0"/>
+              <a:t>guide, provide info, perform analysis</a:t>
             </a:r>
             <a:endParaRPr lang="en-US" sz="2400" dirty="0"/>
           </a:p>
@@ -3984,127 +3836,19 @@
       </p:sp>
       <p:sp>
         <p:nvSpPr>
-          <p:cNvPr id="42" name="Rectangle 41"/>
-          <p:cNvSpPr/>
+          <p:cNvPr id="47" name="TextBox 46"/>
+          <p:cNvSpPr txBox="1"/>
           <p:nvPr/>
         </p:nvSpPr>
         <p:spPr>
           <a:xfrm>
-            <a:off x="5606793" y="399194"/>
-            <a:ext cx="6188969" cy="5977222"/>
+            <a:off x="2197510" y="4247676"/>
+            <a:ext cx="1518043" cy="1938992"/>
           </a:xfrm>
           <a:prstGeom prst="rect">
             <a:avLst/>
           </a:prstGeom>
           <a:noFill/>
-          <a:ln>
-            <a:solidFill>
-              <a:schemeClr val="tx1"/>
-            </a:solidFill>
-          </a:ln>
-        </p:spPr>
-        <p:style>
-          <a:lnRef idx="2">
-            <a:schemeClr val="accent1">
-              <a:shade val="50000"/>
-            </a:schemeClr>
-          </a:lnRef>
-          <a:fillRef idx="1">
-            <a:schemeClr val="accent1"/>
-          </a:fillRef>
-          <a:effectRef idx="0">
-            <a:schemeClr val="accent1"/>
-          </a:effectRef>
-          <a:fontRef idx="minor">
-            <a:schemeClr val="lt1"/>
-          </a:fontRef>
-        </p:style>
-        <p:txBody>
-          <a:bodyPr rtlCol="0" anchor="t"/>
-          <a:lstStyle/>
-          <a:p>
-            <a:pPr algn="ctr"/>
-            <a:r>
-              <a:rPr lang="en-US" sz="2400" dirty="0" smtClean="0">
-                <a:solidFill>
-                  <a:schemeClr val="tx1"/>
-                </a:solidFill>
-              </a:rPr>
-              <a:t>System Development Process</a:t>
-            </a:r>
-            <a:endParaRPr lang="en-US" sz="2400" dirty="0"/>
-          </a:p>
-        </p:txBody>
-      </p:sp>
-      <p:sp>
-        <p:nvSpPr>
-          <p:cNvPr id="43" name="Rectangle 42"/>
-          <p:cNvSpPr/>
-          <p:nvPr/>
-        </p:nvSpPr>
-        <p:spPr>
-          <a:xfrm>
-            <a:off x="3875005" y="3511878"/>
-            <a:ext cx="1221117" cy="806372"/>
-          </a:xfrm>
-          <a:prstGeom prst="rect">
-            <a:avLst/>
-          </a:prstGeom>
-          <a:noFill/>
-          <a:ln>
-            <a:solidFill>
-              <a:schemeClr val="tx1"/>
-            </a:solidFill>
-          </a:ln>
-        </p:spPr>
-        <p:style>
-          <a:lnRef idx="2">
-            <a:schemeClr val="accent1">
-              <a:shade val="50000"/>
-            </a:schemeClr>
-          </a:lnRef>
-          <a:fillRef idx="1">
-            <a:schemeClr val="accent1"/>
-          </a:fillRef>
-          <a:effectRef idx="0">
-            <a:schemeClr val="accent1"/>
-          </a:effectRef>
-          <a:fontRef idx="minor">
-            <a:schemeClr val="lt1"/>
-          </a:fontRef>
-        </p:style>
-        <p:txBody>
-          <a:bodyPr rtlCol="0" anchor="t"/>
-          <a:lstStyle/>
-          <a:p>
-            <a:pPr algn="ctr"/>
-            <a:r>
-              <a:rPr lang="en-US" sz="2400" dirty="0" smtClean="0">
-                <a:solidFill>
-                  <a:schemeClr val="tx1"/>
-                </a:solidFill>
-              </a:rPr>
-              <a:t>Failure Rates</a:t>
-            </a:r>
-            <a:endParaRPr lang="en-US" sz="2400" dirty="0"/>
-          </a:p>
-        </p:txBody>
-      </p:sp>
-      <p:sp>
-        <p:nvSpPr>
-          <p:cNvPr id="44" name="TextBox 43"/>
-          <p:cNvSpPr txBox="1"/>
-          <p:nvPr/>
-        </p:nvSpPr>
-        <p:spPr>
-          <a:xfrm>
-            <a:off x="880777" y="4596383"/>
-            <a:ext cx="975360" cy="1107996"/>
-          </a:xfrm>
-          <a:prstGeom prst="rect">
-            <a:avLst/>
-          </a:prstGeom>
-          <a:noFill/>
         </p:spPr>
         <p:txBody>
           <a:bodyPr wrap="square" rtlCol="0">
@@ -4113,163 +3857,206 @@
           <a:lstStyle/>
           <a:p>
             <a:r>
-              <a:rPr lang="en-US" sz="6600" dirty="0" smtClean="0"/>
-              <a:t>…</a:t>
-            </a:r>
-            <a:endParaRPr lang="en-US" sz="6600" dirty="0"/>
-          </a:p>
-        </p:txBody>
-      </p:sp>
-      <p:sp>
-        <p:nvSpPr>
-          <p:cNvPr id="45" name="TextBox 44"/>
-          <p:cNvSpPr txBox="1"/>
+              <a:rPr lang="en-US" sz="2400" dirty="0"/>
+              <a:t>u</a:t>
+            </a:r>
+            <a:r>
+              <a:rPr lang="en-US" sz="2400" dirty="0" smtClean="0"/>
+              <a:t>pdate, feedback,</a:t>
+            </a:r>
+          </a:p>
+          <a:p>
+            <a:r>
+              <a:rPr lang="en-US" sz="2400" dirty="0"/>
+              <a:t>g</a:t>
+            </a:r>
+            <a:r>
+              <a:rPr lang="en-US" sz="2400" dirty="0" smtClean="0"/>
+              <a:t>enerate artifacts for review</a:t>
+            </a:r>
+            <a:endParaRPr lang="en-US" sz="2400" dirty="0"/>
+          </a:p>
+        </p:txBody>
+      </p:sp>
+      <p:cxnSp>
+        <p:nvCxnSpPr>
+          <p:cNvPr id="3" name="Straight Arrow Connector 2"/>
+          <p:cNvCxnSpPr>
+            <a:stCxn id="8" idx="3"/>
+          </p:cNvCxnSpPr>
           <p:nvPr/>
-        </p:nvSpPr>
-        <p:spPr>
-          <a:xfrm>
-            <a:off x="6328393" y="4060124"/>
-            <a:ext cx="975360" cy="1107996"/>
-          </a:xfrm>
-          <a:prstGeom prst="rect">
+        </p:nvCxnSpPr>
+        <p:spPr>
+          <a:xfrm>
+            <a:off x="1792224" y="2395728"/>
+            <a:ext cx="1923329" cy="992365"/>
+          </a:xfrm>
+          <a:prstGeom prst="straightConnector1">
             <a:avLst/>
           </a:prstGeom>
-          <a:noFill/>
-        </p:spPr>
-        <p:txBody>
-          <a:bodyPr wrap="square" rtlCol="0">
-            <a:spAutoFit/>
-          </a:bodyPr>
-          <a:lstStyle/>
-          <a:p>
-            <a:r>
-              <a:rPr lang="en-US" sz="6600" dirty="0" smtClean="0"/>
-              <a:t>…</a:t>
-            </a:r>
-            <a:endParaRPr lang="en-US" sz="6600" dirty="0"/>
-          </a:p>
-        </p:txBody>
-      </p:sp>
-      <p:sp>
-        <p:nvSpPr>
-          <p:cNvPr id="46" name="TextBox 45"/>
-          <p:cNvSpPr txBox="1"/>
+          <a:ln>
+            <a:headEnd type="triangle"/>
+            <a:tailEnd type="triangle"/>
+          </a:ln>
+        </p:spPr>
+        <p:style>
+          <a:lnRef idx="3">
+            <a:schemeClr val="dk1"/>
+          </a:lnRef>
+          <a:fillRef idx="0">
+            <a:schemeClr val="dk1"/>
+          </a:fillRef>
+          <a:effectRef idx="2">
+            <a:schemeClr val="dk1"/>
+          </a:effectRef>
+          <a:fontRef idx="minor">
+            <a:schemeClr val="tx1"/>
+          </a:fontRef>
+        </p:style>
+      </p:cxnSp>
+      <p:cxnSp>
+        <p:nvCxnSpPr>
+          <p:cNvPr id="33" name="Straight Arrow Connector 32"/>
+          <p:cNvCxnSpPr>
+            <a:stCxn id="9" idx="3"/>
+            <a:endCxn id="6" idx="1"/>
+          </p:cNvCxnSpPr>
           <p:nvPr/>
-        </p:nvSpPr>
-        <p:spPr>
-          <a:xfrm>
-            <a:off x="2390540" y="1106146"/>
-            <a:ext cx="1380073" cy="1938992"/>
-          </a:xfrm>
-          <a:prstGeom prst="rect">
+        </p:nvCxnSpPr>
+        <p:spPr>
+          <a:xfrm flipV="1">
+            <a:off x="1792224" y="3664804"/>
+            <a:ext cx="1935448" cy="727458"/>
+          </a:xfrm>
+          <a:prstGeom prst="straightConnector1">
             <a:avLst/>
           </a:prstGeom>
-          <a:noFill/>
-        </p:spPr>
-        <p:txBody>
-          <a:bodyPr wrap="square" rtlCol="0">
-            <a:spAutoFit/>
-          </a:bodyPr>
-          <a:lstStyle/>
-          <a:p>
-            <a:r>
-              <a:rPr lang="en-US" sz="2400" dirty="0" smtClean="0"/>
-              <a:t>guide, provide info, perform analysis</a:t>
-            </a:r>
-            <a:endParaRPr lang="en-US" sz="2400" dirty="0"/>
-          </a:p>
-        </p:txBody>
-      </p:sp>
-      <p:sp>
-        <p:nvSpPr>
-          <p:cNvPr id="47" name="TextBox 46"/>
-          <p:cNvSpPr txBox="1"/>
+          <a:ln>
+            <a:headEnd type="triangle"/>
+            <a:tailEnd type="triangle"/>
+          </a:ln>
+        </p:spPr>
+        <p:style>
+          <a:lnRef idx="3">
+            <a:schemeClr val="dk1"/>
+          </a:lnRef>
+          <a:fillRef idx="0">
+            <a:schemeClr val="dk1"/>
+          </a:fillRef>
+          <a:effectRef idx="2">
+            <a:schemeClr val="dk1"/>
+          </a:effectRef>
+          <a:fontRef idx="minor">
+            <a:schemeClr val="tx1"/>
+          </a:fontRef>
+        </p:style>
+      </p:cxnSp>
+      <p:cxnSp>
+        <p:nvCxnSpPr>
+          <p:cNvPr id="21" name="Straight Arrow Connector 20"/>
+          <p:cNvCxnSpPr>
+            <a:stCxn id="10" idx="1"/>
+          </p:cNvCxnSpPr>
           <p:nvPr/>
-        </p:nvSpPr>
-        <p:spPr>
-          <a:xfrm>
-            <a:off x="2197510" y="4247676"/>
-            <a:ext cx="1518043" cy="1938992"/>
-          </a:xfrm>
-          <a:prstGeom prst="rect">
+        </p:nvCxnSpPr>
+        <p:spPr>
+          <a:xfrm flipH="1">
+            <a:off x="7738841" y="1678384"/>
+            <a:ext cx="1732943" cy="717344"/>
+          </a:xfrm>
+          <a:prstGeom prst="straightConnector1">
             <a:avLst/>
           </a:prstGeom>
-          <a:noFill/>
-        </p:spPr>
-        <p:txBody>
-          <a:bodyPr wrap="square" rtlCol="0">
-            <a:spAutoFit/>
-          </a:bodyPr>
-          <a:lstStyle/>
-          <a:p>
-            <a:r>
-              <a:rPr lang="en-US" sz="2400" dirty="0"/>
-              <a:t>u</a:t>
-            </a:r>
-            <a:r>
-              <a:rPr lang="en-US" sz="2400" dirty="0" smtClean="0"/>
-              <a:t>pdate, feedback,</a:t>
-            </a:r>
-          </a:p>
-          <a:p>
-            <a:r>
-              <a:rPr lang="en-US" sz="2400" dirty="0"/>
-              <a:t>g</a:t>
-            </a:r>
-            <a:r>
-              <a:rPr lang="en-US" sz="2400" dirty="0" smtClean="0"/>
-              <a:t>enerate artifacts for review</a:t>
-            </a:r>
-            <a:endParaRPr lang="en-US" sz="2400" dirty="0"/>
-          </a:p>
-        </p:txBody>
-      </p:sp>
-      <p:sp>
-        <p:nvSpPr>
-          <p:cNvPr id="48" name="Left-Right Arrow 47"/>
-          <p:cNvSpPr/>
+          <a:ln>
+            <a:tailEnd type="triangle"/>
+          </a:ln>
+        </p:spPr>
+        <p:style>
+          <a:lnRef idx="3">
+            <a:schemeClr val="dk1"/>
+          </a:lnRef>
+          <a:fillRef idx="0">
+            <a:schemeClr val="dk1"/>
+          </a:fillRef>
+          <a:effectRef idx="2">
+            <a:schemeClr val="dk1"/>
+          </a:effectRef>
+          <a:fontRef idx="minor">
+            <a:schemeClr val="tx1"/>
+          </a:fontRef>
+        </p:style>
+      </p:cxnSp>
+      <p:cxnSp>
+        <p:nvCxnSpPr>
+          <p:cNvPr id="49" name="Straight Arrow Connector 48"/>
+          <p:cNvCxnSpPr>
+            <a:stCxn id="11" idx="1"/>
+            <a:endCxn id="6" idx="3"/>
+          </p:cNvCxnSpPr>
           <p:nvPr/>
-        </p:nvSpPr>
-        <p:spPr>
-          <a:xfrm>
-            <a:off x="7944203" y="3328327"/>
-            <a:ext cx="1033176" cy="513584"/>
-          </a:xfrm>
-          <a:prstGeom prst="leftRightArrow">
+        </p:nvCxnSpPr>
+        <p:spPr>
+          <a:xfrm flipH="1">
+            <a:off x="7738840" y="3614790"/>
+            <a:ext cx="1732944" cy="50014"/>
+          </a:xfrm>
+          <a:prstGeom prst="straightConnector1">
             <a:avLst/>
           </a:prstGeom>
-          <a:noFill/>
           <a:ln>
-            <a:solidFill>
-              <a:schemeClr val="tx1"/>
-            </a:solidFill>
+            <a:tailEnd type="triangle"/>
           </a:ln>
         </p:spPr>
         <p:style>
-          <a:lnRef idx="2">
-            <a:schemeClr val="accent1">
-              <a:shade val="50000"/>
-            </a:schemeClr>
+          <a:lnRef idx="3">
+            <a:schemeClr val="dk1"/>
           </a:lnRef>
-          <a:fillRef idx="1">
-            <a:schemeClr val="accent1"/>
+          <a:fillRef idx="0">
+            <a:schemeClr val="dk1"/>
           </a:fillRef>
-          <a:effectRef idx="0">
-            <a:schemeClr val="accent1"/>
+          <a:effectRef idx="2">
+            <a:schemeClr val="dk1"/>
           </a:effectRef>
           <a:fontRef idx="minor">
-            <a:schemeClr val="lt1"/>
+            <a:schemeClr val="tx1"/>
           </a:fontRef>
         </p:style>
-        <p:txBody>
-          <a:bodyPr rtlCol="0" anchor="ctr"/>
-          <a:lstStyle/>
-          <a:p>
-            <a:pPr algn="ctr"/>
-            <a:endParaRPr lang="en-US"/>
-          </a:p>
-        </p:txBody>
-      </p:sp>
+      </p:cxnSp>
+      <p:cxnSp>
+        <p:nvCxnSpPr>
+          <p:cNvPr id="50" name="Straight Arrow Connector 49"/>
+          <p:cNvCxnSpPr>
+            <a:stCxn id="12" idx="1"/>
+          </p:cNvCxnSpPr>
+          <p:nvPr/>
+        </p:nvCxnSpPr>
+        <p:spPr>
+          <a:xfrm flipH="1" flipV="1">
+            <a:off x="7738841" y="4596383"/>
+            <a:ext cx="1705418" cy="875653"/>
+          </a:xfrm>
+          <a:prstGeom prst="straightConnector1">
+            <a:avLst/>
+          </a:prstGeom>
+          <a:ln>
+            <a:tailEnd type="triangle"/>
+          </a:ln>
+        </p:spPr>
+        <p:style>
+          <a:lnRef idx="3">
+            <a:schemeClr val="dk1"/>
+          </a:lnRef>
+          <a:fillRef idx="0">
+            <a:schemeClr val="dk1"/>
+          </a:fillRef>
+          <a:effectRef idx="2">
+            <a:schemeClr val="dk1"/>
+          </a:effectRef>
+          <a:fontRef idx="minor">
+            <a:schemeClr val="tx1"/>
+          </a:fontRef>
+        </p:style>
+      </p:cxnSp>
     </p:spTree>
     <p:extLst>
       <p:ext uri="{BB962C8B-B14F-4D97-AF65-F5344CB8AC3E}">

</xml_diff>